<commit_message>
Ergänzung Fachkonzept und Präsentation, Finalisieren der Use-Case Diagramme
</commit_message>
<xml_diff>
--- a/Festiva.pptx
+++ b/Festiva.pptx
@@ -5,7 +5,7 @@
     <p:sldMasterId id="2147483648" r:id="rId1"/>
   </p:sldMasterIdLst>
   <p:notesMasterIdLst>
-    <p:notesMasterId r:id="rId15"/>
+    <p:notesMasterId r:id="rId19"/>
   </p:notesMasterIdLst>
   <p:sldIdLst>
     <p:sldId id="256" r:id="rId2"/>
@@ -18,9 +18,13 @@
     <p:sldId id="275" r:id="rId9"/>
     <p:sldId id="276" r:id="rId10"/>
     <p:sldId id="277" r:id="rId11"/>
-    <p:sldId id="278" r:id="rId12"/>
-    <p:sldId id="284" r:id="rId13"/>
-    <p:sldId id="266" r:id="rId14"/>
+    <p:sldId id="288" r:id="rId12"/>
+    <p:sldId id="285" r:id="rId13"/>
+    <p:sldId id="286" r:id="rId14"/>
+    <p:sldId id="287" r:id="rId15"/>
+    <p:sldId id="278" r:id="rId16"/>
+    <p:sldId id="284" r:id="rId17"/>
+    <p:sldId id="266" r:id="rId18"/>
   </p:sldIdLst>
   <p:sldSz cx="12192000" cy="6858000"/>
   <p:notesSz cx="6858000" cy="9144000"/>
@@ -10687,7 +10691,7 @@
           <a:p>
             <a:fld id="{112B0589-E740-4EC8-A0B5-BAD19E3BC924}" type="datetimeFigureOut">
               <a:rPr lang="de-DE" smtClean="0"/>
-              <a:t>15.10.2016</a:t>
+              <a:t>16.10.2016</a:t>
             </a:fld>
             <a:endParaRPr lang="de-DE"/>
           </a:p>
@@ -11067,8 +11071,13 @@
             </a:fld>
             <a:r>
               <a:rPr lang="de-DE" sz="1400" dirty="0"/>
-              <a:t>/14</a:t>
+              <a:t>/</a:t>
             </a:r>
+            <a:r>
+              <a:rPr lang="de-DE" sz="1400" dirty="0" smtClean="0"/>
+              <a:t>17</a:t>
+            </a:r>
+            <a:endParaRPr lang="de-DE" sz="1400" dirty="0"/>
           </a:p>
           <a:p>
             <a:endParaRPr lang="de-DE" sz="1400" dirty="0"/>
@@ -13083,7 +13092,7 @@
           <a:p>
             <a:fld id="{2574F77A-6513-48AD-997B-A58730D77229}" type="datetimeFigureOut">
               <a:rPr lang="de-DE" smtClean="0"/>
-              <a:t>15.10.2016</a:t>
+              <a:t>16.10.2016</a:t>
             </a:fld>
             <a:endParaRPr lang="de-DE" dirty="0"/>
           </a:p>
@@ -13754,16 +13763,47 @@
           <a:lstStyle/>
           <a:p>
             <a:r>
-              <a:rPr lang="de-DE" sz="2800" b="1" dirty="0" err="1"/>
+              <a:rPr lang="de-DE" sz="2800" b="1" dirty="0" err="1" smtClean="0"/>
               <a:t>Use</a:t>
             </a:r>
             <a:r>
-              <a:rPr lang="de-DE" sz="2800" b="1" dirty="0"/>
-              <a:t>-Case-Diagramme</a:t>
+              <a:rPr lang="de-DE" sz="2800" b="1" dirty="0" smtClean="0"/>
+              <a:t>-Case-Diagramm - Besucher</a:t>
             </a:r>
+            <a:endParaRPr lang="de-DE" sz="2800" b="1" dirty="0"/>
           </a:p>
         </p:txBody>
       </p:sp>
+      <p:pic>
+        <p:nvPicPr>
+          <p:cNvPr id="4" name="Grafik 3"/>
+          <p:cNvPicPr>
+            <a:picLocks noChangeAspect="1"/>
+          </p:cNvPicPr>
+          <p:nvPr/>
+        </p:nvPicPr>
+        <p:blipFill>
+          <a:blip r:embed="rId2">
+            <a:extLst>
+              <a:ext uri="{28A0092B-C50C-407E-A947-70E740481C1C}">
+                <a14:useLocalDpi xmlns:a14="http://schemas.microsoft.com/office/drawing/2010/main" val="0"/>
+              </a:ext>
+            </a:extLst>
+          </a:blip>
+          <a:stretch>
+            <a:fillRect/>
+          </a:stretch>
+        </p:blipFill>
+        <p:spPr>
+          <a:xfrm>
+            <a:off x="925092" y="1561697"/>
+            <a:ext cx="7738131" cy="4027734"/>
+          </a:xfrm>
+          <a:prstGeom prst="rect">
+            <a:avLst/>
+          </a:prstGeom>
+        </p:spPr>
+      </p:pic>
     </p:spTree>
     <p:extLst>
       <p:ext uri="{BB962C8B-B14F-4D97-AF65-F5344CB8AC3E}">
@@ -13774,10 +13814,425 @@
   <p:clrMapOvr>
     <a:masterClrMapping/>
   </p:clrMapOvr>
+  <p:timing>
+    <p:tnLst>
+      <p:par>
+        <p:cTn id="1" dur="indefinite" restart="never" nodeType="tmRoot"/>
+      </p:par>
+    </p:tnLst>
+  </p:timing>
 </p:sld>
 </file>
 
 <file path=ppt/slides/slide11.xml><?xml version="1.0" encoding="utf-8"?>
+<p:sld xmlns:a="http://schemas.openxmlformats.org/drawingml/2006/main" xmlns:r="http://schemas.openxmlformats.org/officeDocument/2006/relationships" xmlns:p="http://schemas.openxmlformats.org/presentationml/2006/main">
+  <p:cSld>
+    <p:spTree>
+      <p:nvGrpSpPr>
+        <p:cNvPr id="1" name=""/>
+        <p:cNvGrpSpPr/>
+        <p:nvPr/>
+      </p:nvGrpSpPr>
+      <p:grpSpPr>
+        <a:xfrm>
+          <a:off x="0" y="0"/>
+          <a:ext cx="0" cy="0"/>
+          <a:chOff x="0" y="0"/>
+          <a:chExt cx="0" cy="0"/>
+        </a:xfrm>
+      </p:grpSpPr>
+      <p:sp>
+        <p:nvSpPr>
+          <p:cNvPr id="2" name="Textfeld 1"/>
+          <p:cNvSpPr txBox="1"/>
+          <p:nvPr/>
+        </p:nvSpPr>
+        <p:spPr>
+          <a:xfrm>
+            <a:off x="925093" y="878153"/>
+            <a:ext cx="6730584" cy="523220"/>
+          </a:xfrm>
+          <a:prstGeom prst="rect">
+            <a:avLst/>
+          </a:prstGeom>
+          <a:noFill/>
+        </p:spPr>
+        <p:txBody>
+          <a:bodyPr wrap="square" rtlCol="0">
+            <a:spAutoFit/>
+          </a:bodyPr>
+          <a:lstStyle/>
+          <a:p>
+            <a:r>
+              <a:rPr lang="de-DE" sz="2800" b="1" dirty="0" err="1" smtClean="0"/>
+              <a:t>Use</a:t>
+            </a:r>
+            <a:r>
+              <a:rPr lang="de-DE" sz="2800" b="1" dirty="0" smtClean="0"/>
+              <a:t>-Case-Diagramm – Registrierter Kunde</a:t>
+            </a:r>
+            <a:endParaRPr lang="de-DE" sz="2800" b="1" dirty="0"/>
+          </a:p>
+        </p:txBody>
+      </p:sp>
+      <p:pic>
+        <p:nvPicPr>
+          <p:cNvPr id="3" name="Grafik 2"/>
+          <p:cNvPicPr>
+            <a:picLocks noChangeAspect="1"/>
+          </p:cNvPicPr>
+          <p:nvPr/>
+        </p:nvPicPr>
+        <p:blipFill>
+          <a:blip r:embed="rId2">
+            <a:extLst>
+              <a:ext uri="{28A0092B-C50C-407E-A947-70E740481C1C}">
+                <a14:useLocalDpi xmlns:a14="http://schemas.microsoft.com/office/drawing/2010/main" val="0"/>
+              </a:ext>
+            </a:extLst>
+          </a:blip>
+          <a:stretch>
+            <a:fillRect/>
+          </a:stretch>
+        </p:blipFill>
+        <p:spPr>
+          <a:xfrm>
+            <a:off x="925092" y="1561699"/>
+            <a:ext cx="7740000" cy="4843211"/>
+          </a:xfrm>
+          <a:prstGeom prst="rect">
+            <a:avLst/>
+          </a:prstGeom>
+        </p:spPr>
+      </p:pic>
+    </p:spTree>
+    <p:extLst>
+      <p:ext uri="{BB962C8B-B14F-4D97-AF65-F5344CB8AC3E}">
+        <p14:creationId xmlns:p14="http://schemas.microsoft.com/office/powerpoint/2010/main" val="3254383111"/>
+      </p:ext>
+    </p:extLst>
+  </p:cSld>
+  <p:clrMapOvr>
+    <a:masterClrMapping/>
+  </p:clrMapOvr>
+  <p:timing>
+    <p:tnLst>
+      <p:par>
+        <p:cTn id="1" dur="indefinite" restart="never" nodeType="tmRoot"/>
+      </p:par>
+    </p:tnLst>
+  </p:timing>
+</p:sld>
+</file>
+
+<file path=ppt/slides/slide12.xml><?xml version="1.0" encoding="utf-8"?>
+<p:sld xmlns:a="http://schemas.openxmlformats.org/drawingml/2006/main" xmlns:r="http://schemas.openxmlformats.org/officeDocument/2006/relationships" xmlns:p="http://schemas.openxmlformats.org/presentationml/2006/main">
+  <p:cSld>
+    <p:spTree>
+      <p:nvGrpSpPr>
+        <p:cNvPr id="1" name=""/>
+        <p:cNvGrpSpPr/>
+        <p:nvPr/>
+      </p:nvGrpSpPr>
+      <p:grpSpPr>
+        <a:xfrm>
+          <a:off x="0" y="0"/>
+          <a:ext cx="0" cy="0"/>
+          <a:chOff x="0" y="0"/>
+          <a:chExt cx="0" cy="0"/>
+        </a:xfrm>
+      </p:grpSpPr>
+      <p:pic>
+        <p:nvPicPr>
+          <p:cNvPr id="4" name="Grafik 3"/>
+          <p:cNvPicPr>
+            <a:picLocks noChangeAspect="1"/>
+          </p:cNvPicPr>
+          <p:nvPr/>
+        </p:nvPicPr>
+        <p:blipFill>
+          <a:blip r:embed="rId2">
+            <a:extLst>
+              <a:ext uri="{28A0092B-C50C-407E-A947-70E740481C1C}">
+                <a14:useLocalDpi xmlns:a14="http://schemas.microsoft.com/office/drawing/2010/main" val="0"/>
+              </a:ext>
+            </a:extLst>
+          </a:blip>
+          <a:stretch>
+            <a:fillRect/>
+          </a:stretch>
+        </p:blipFill>
+        <p:spPr>
+          <a:xfrm>
+            <a:off x="925092" y="1561699"/>
+            <a:ext cx="7740000" cy="3471146"/>
+          </a:xfrm>
+          <a:prstGeom prst="rect">
+            <a:avLst/>
+          </a:prstGeom>
+        </p:spPr>
+      </p:pic>
+      <p:sp>
+        <p:nvSpPr>
+          <p:cNvPr id="5" name="Textfeld 4"/>
+          <p:cNvSpPr txBox="1"/>
+          <p:nvPr/>
+        </p:nvSpPr>
+        <p:spPr>
+          <a:xfrm>
+            <a:off x="925093" y="878153"/>
+            <a:ext cx="6730584" cy="523220"/>
+          </a:xfrm>
+          <a:prstGeom prst="rect">
+            <a:avLst/>
+          </a:prstGeom>
+          <a:noFill/>
+        </p:spPr>
+        <p:txBody>
+          <a:bodyPr wrap="square" rtlCol="0">
+            <a:spAutoFit/>
+          </a:bodyPr>
+          <a:lstStyle/>
+          <a:p>
+            <a:r>
+              <a:rPr lang="de-DE" sz="2800" b="1" dirty="0" err="1" smtClean="0"/>
+              <a:t>Use</a:t>
+            </a:r>
+            <a:r>
+              <a:rPr lang="de-DE" sz="2800" b="1" dirty="0" smtClean="0"/>
+              <a:t>-Case-Diagramm – Kundenverwaltung</a:t>
+            </a:r>
+            <a:endParaRPr lang="de-DE" sz="2800" b="1" dirty="0"/>
+          </a:p>
+        </p:txBody>
+      </p:sp>
+    </p:spTree>
+    <p:extLst>
+      <p:ext uri="{BB962C8B-B14F-4D97-AF65-F5344CB8AC3E}">
+        <p14:creationId xmlns:p14="http://schemas.microsoft.com/office/powerpoint/2010/main" val="2053615884"/>
+      </p:ext>
+    </p:extLst>
+  </p:cSld>
+  <p:clrMapOvr>
+    <a:masterClrMapping/>
+  </p:clrMapOvr>
+  <p:timing>
+    <p:tnLst>
+      <p:par>
+        <p:cTn id="1" dur="indefinite" restart="never" nodeType="tmRoot"/>
+      </p:par>
+    </p:tnLst>
+  </p:timing>
+</p:sld>
+</file>
+
+<file path=ppt/slides/slide13.xml><?xml version="1.0" encoding="utf-8"?>
+<p:sld xmlns:a="http://schemas.openxmlformats.org/drawingml/2006/main" xmlns:r="http://schemas.openxmlformats.org/officeDocument/2006/relationships" xmlns:p="http://schemas.openxmlformats.org/presentationml/2006/main">
+  <p:cSld>
+    <p:spTree>
+      <p:nvGrpSpPr>
+        <p:cNvPr id="1" name=""/>
+        <p:cNvGrpSpPr/>
+        <p:nvPr/>
+      </p:nvGrpSpPr>
+      <p:grpSpPr>
+        <a:xfrm>
+          <a:off x="0" y="0"/>
+          <a:ext cx="0" cy="0"/>
+          <a:chOff x="0" y="0"/>
+          <a:chExt cx="0" cy="0"/>
+        </a:xfrm>
+      </p:grpSpPr>
+      <p:pic>
+        <p:nvPicPr>
+          <p:cNvPr id="2" name="Grafik 1"/>
+          <p:cNvPicPr>
+            <a:picLocks noChangeAspect="1"/>
+          </p:cNvPicPr>
+          <p:nvPr/>
+        </p:nvPicPr>
+        <p:blipFill>
+          <a:blip r:embed="rId2">
+            <a:extLst>
+              <a:ext uri="{28A0092B-C50C-407E-A947-70E740481C1C}">
+                <a14:useLocalDpi xmlns:a14="http://schemas.microsoft.com/office/drawing/2010/main" val="0"/>
+              </a:ext>
+            </a:extLst>
+          </a:blip>
+          <a:stretch>
+            <a:fillRect/>
+          </a:stretch>
+        </p:blipFill>
+        <p:spPr>
+          <a:xfrm>
+            <a:off x="925092" y="1561699"/>
+            <a:ext cx="7613840" cy="3470400"/>
+          </a:xfrm>
+          <a:prstGeom prst="rect">
+            <a:avLst/>
+          </a:prstGeom>
+        </p:spPr>
+      </p:pic>
+      <p:sp>
+        <p:nvSpPr>
+          <p:cNvPr id="5" name="Textfeld 4"/>
+          <p:cNvSpPr txBox="1"/>
+          <p:nvPr/>
+        </p:nvSpPr>
+        <p:spPr>
+          <a:xfrm>
+            <a:off x="925093" y="878153"/>
+            <a:ext cx="6730584" cy="523220"/>
+          </a:xfrm>
+          <a:prstGeom prst="rect">
+            <a:avLst/>
+          </a:prstGeom>
+          <a:noFill/>
+        </p:spPr>
+        <p:txBody>
+          <a:bodyPr wrap="square" rtlCol="0">
+            <a:spAutoFit/>
+          </a:bodyPr>
+          <a:lstStyle/>
+          <a:p>
+            <a:r>
+              <a:rPr lang="de-DE" sz="2800" b="1" dirty="0" err="1" smtClean="0"/>
+              <a:t>Use</a:t>
+            </a:r>
+            <a:r>
+              <a:rPr lang="de-DE" sz="2800" b="1" dirty="0" smtClean="0"/>
+              <a:t>-Case-Diagramm – </a:t>
+            </a:r>
+            <a:r>
+              <a:rPr lang="de-DE" sz="2800" b="1" dirty="0" err="1" smtClean="0"/>
+              <a:t>Kategorieverwaltung</a:t>
+            </a:r>
+            <a:endParaRPr lang="de-DE" sz="2800" b="1" dirty="0"/>
+          </a:p>
+        </p:txBody>
+      </p:sp>
+    </p:spTree>
+    <p:extLst>
+      <p:ext uri="{BB962C8B-B14F-4D97-AF65-F5344CB8AC3E}">
+        <p14:creationId xmlns:p14="http://schemas.microsoft.com/office/powerpoint/2010/main" val="3607409300"/>
+      </p:ext>
+    </p:extLst>
+  </p:cSld>
+  <p:clrMapOvr>
+    <a:masterClrMapping/>
+  </p:clrMapOvr>
+  <p:timing>
+    <p:tnLst>
+      <p:par>
+        <p:cTn id="1" dur="indefinite" restart="never" nodeType="tmRoot"/>
+      </p:par>
+    </p:tnLst>
+  </p:timing>
+</p:sld>
+</file>
+
+<file path=ppt/slides/slide14.xml><?xml version="1.0" encoding="utf-8"?>
+<p:sld xmlns:a="http://schemas.openxmlformats.org/drawingml/2006/main" xmlns:r="http://schemas.openxmlformats.org/officeDocument/2006/relationships" xmlns:p="http://schemas.openxmlformats.org/presentationml/2006/main">
+  <p:cSld>
+    <p:spTree>
+      <p:nvGrpSpPr>
+        <p:cNvPr id="1" name=""/>
+        <p:cNvGrpSpPr/>
+        <p:nvPr/>
+      </p:nvGrpSpPr>
+      <p:grpSpPr>
+        <a:xfrm>
+          <a:off x="0" y="0"/>
+          <a:ext cx="0" cy="0"/>
+          <a:chOff x="0" y="0"/>
+          <a:chExt cx="0" cy="0"/>
+        </a:xfrm>
+      </p:grpSpPr>
+      <p:pic>
+        <p:nvPicPr>
+          <p:cNvPr id="3" name="Grafik 2"/>
+          <p:cNvPicPr>
+            <a:picLocks noChangeAspect="1"/>
+          </p:cNvPicPr>
+          <p:nvPr/>
+        </p:nvPicPr>
+        <p:blipFill>
+          <a:blip r:embed="rId2">
+            <a:extLst>
+              <a:ext uri="{28A0092B-C50C-407E-A947-70E740481C1C}">
+                <a14:useLocalDpi xmlns:a14="http://schemas.microsoft.com/office/drawing/2010/main" val="0"/>
+              </a:ext>
+            </a:extLst>
+          </a:blip>
+          <a:stretch>
+            <a:fillRect/>
+          </a:stretch>
+        </p:blipFill>
+        <p:spPr>
+          <a:xfrm>
+            <a:off x="925092" y="1561699"/>
+            <a:ext cx="7603484" cy="3470400"/>
+          </a:xfrm>
+          <a:prstGeom prst="rect">
+            <a:avLst/>
+          </a:prstGeom>
+        </p:spPr>
+      </p:pic>
+      <p:sp>
+        <p:nvSpPr>
+          <p:cNvPr id="4" name="Textfeld 3"/>
+          <p:cNvSpPr txBox="1"/>
+          <p:nvPr/>
+        </p:nvSpPr>
+        <p:spPr>
+          <a:xfrm>
+            <a:off x="925093" y="878153"/>
+            <a:ext cx="6730584" cy="523220"/>
+          </a:xfrm>
+          <a:prstGeom prst="rect">
+            <a:avLst/>
+          </a:prstGeom>
+          <a:noFill/>
+        </p:spPr>
+        <p:txBody>
+          <a:bodyPr wrap="square" rtlCol="0">
+            <a:spAutoFit/>
+          </a:bodyPr>
+          <a:lstStyle/>
+          <a:p>
+            <a:r>
+              <a:rPr lang="de-DE" sz="2800" b="1" dirty="0" err="1" smtClean="0"/>
+              <a:t>Use</a:t>
+            </a:r>
+            <a:r>
+              <a:rPr lang="de-DE" sz="2800" b="1" dirty="0" smtClean="0"/>
+              <a:t>-Case-Diagramm – Festivalverwaltung</a:t>
+            </a:r>
+            <a:endParaRPr lang="de-DE" sz="2800" b="1" dirty="0"/>
+          </a:p>
+        </p:txBody>
+      </p:sp>
+    </p:spTree>
+    <p:extLst>
+      <p:ext uri="{BB962C8B-B14F-4D97-AF65-F5344CB8AC3E}">
+        <p14:creationId xmlns:p14="http://schemas.microsoft.com/office/powerpoint/2010/main" val="2710926660"/>
+      </p:ext>
+    </p:extLst>
+  </p:cSld>
+  <p:clrMapOvr>
+    <a:masterClrMapping/>
+  </p:clrMapOvr>
+  <p:timing>
+    <p:tnLst>
+      <p:par>
+        <p:cTn id="1" dur="indefinite" restart="never" nodeType="tmRoot"/>
+      </p:par>
+    </p:tnLst>
+  </p:timing>
+</p:sld>
+</file>
+
+<file path=ppt/slides/slide15.xml><?xml version="1.0" encoding="utf-8"?>
 <p:sld xmlns:a="http://schemas.openxmlformats.org/drawingml/2006/main" xmlns:r="http://schemas.openxmlformats.org/officeDocument/2006/relationships" xmlns:p="http://schemas.openxmlformats.org/presentationml/2006/main">
   <p:cSld>
     <p:bg>
@@ -13869,6 +14324,10 @@
                 <a:spcPct val="150000"/>
               </a:lnSpc>
             </a:pPr>
+            <a:r>
+              <a:rPr lang="de-DE" sz="2000" dirty="0"/>
+              <a:t/>
+            </a:r>
             <a:br>
               <a:rPr lang="de-DE" sz="2000" dirty="0"/>
             </a:br>
@@ -13951,10 +14410,17 @@
   <p:clrMapOvr>
     <a:masterClrMapping/>
   </p:clrMapOvr>
+  <p:timing>
+    <p:tnLst>
+      <p:par>
+        <p:cTn id="1" dur="indefinite" restart="never" nodeType="tmRoot"/>
+      </p:par>
+    </p:tnLst>
+  </p:timing>
 </p:sld>
 </file>
 
-<file path=ppt/slides/slide12.xml><?xml version="1.0" encoding="utf-8"?>
+<file path=ppt/slides/slide16.xml><?xml version="1.0" encoding="utf-8"?>
 <p:sld xmlns:a="http://schemas.openxmlformats.org/drawingml/2006/main" xmlns:r="http://schemas.openxmlformats.org/officeDocument/2006/relationships" xmlns:p="http://schemas.openxmlformats.org/presentationml/2006/main">
   <p:cSld>
     <p:spTree>
@@ -14078,10 +14544,17 @@
   <p:clrMapOvr>
     <a:masterClrMapping/>
   </p:clrMapOvr>
+  <p:timing>
+    <p:tnLst>
+      <p:par>
+        <p:cTn id="1" dur="indefinite" restart="never" nodeType="tmRoot"/>
+      </p:par>
+    </p:tnLst>
+  </p:timing>
 </p:sld>
 </file>
 
-<file path=ppt/slides/slide13.xml><?xml version="1.0" encoding="utf-8"?>
+<file path=ppt/slides/slide17.xml><?xml version="1.0" encoding="utf-8"?>
 <p:sld xmlns:a="http://schemas.openxmlformats.org/drawingml/2006/main" xmlns:r="http://schemas.openxmlformats.org/officeDocument/2006/relationships" xmlns:p="http://schemas.openxmlformats.org/presentationml/2006/main">
   <p:cSld>
     <p:spTree>
@@ -14138,6 +14611,13 @@
   <p:clrMapOvr>
     <a:masterClrMapping/>
   </p:clrMapOvr>
+  <p:timing>
+    <p:tnLst>
+      <p:par>
+        <p:cTn id="1" dur="indefinite" restart="never" nodeType="tmRoot"/>
+      </p:par>
+    </p:tnLst>
+  </p:timing>
 </p:sld>
 </file>
 
@@ -14321,6 +14801,13 @@
   <p:clrMapOvr>
     <a:masterClrMapping/>
   </p:clrMapOvr>
+  <p:timing>
+    <p:tnLst>
+      <p:par>
+        <p:cTn id="1" dur="indefinite" restart="never" nodeType="tmRoot"/>
+      </p:par>
+    </p:tnLst>
+  </p:timing>
 </p:sld>
 </file>
 
@@ -14408,9 +14895,17 @@
                   <a:spcPts val="1200"/>
                 </a:spcBef>
               </a:pPr>
+              <a:r>
+                <a:rPr lang="de-DE" sz="2000" dirty="0"/>
+                <a:t/>
+              </a:r>
               <a:br>
                 <a:rPr lang="de-DE" sz="2000" dirty="0"/>
               </a:br>
+              <a:r>
+                <a:rPr lang="de-DE" sz="2000" dirty="0"/>
+                <a:t/>
+              </a:r>
               <a:br>
                 <a:rPr lang="de-DE" sz="2000" dirty="0"/>
               </a:br>
@@ -14425,6 +14920,10 @@
                   <a:spcPct val="150000"/>
                 </a:lnSpc>
               </a:pPr>
+              <a:r>
+                <a:rPr lang="de-DE" sz="2000" dirty="0"/>
+                <a:t/>
+              </a:r>
               <a:br>
                 <a:rPr lang="de-DE" sz="2000" dirty="0"/>
               </a:br>
@@ -15662,6 +16161,13 @@
   <p:clrMapOvr>
     <a:masterClrMapping/>
   </p:clrMapOvr>
+  <p:timing>
+    <p:tnLst>
+      <p:par>
+        <p:cTn id="1" dur="indefinite" restart="never" nodeType="tmRoot"/>
+      </p:par>
+    </p:tnLst>
+  </p:timing>
 </p:sld>
 </file>
 
@@ -15691,7 +16197,7 @@
         <p:spPr>
           <a:xfrm>
             <a:off x="991353" y="1625199"/>
-            <a:ext cx="9863527" cy="1477328"/>
+            <a:ext cx="9863527" cy="3785652"/>
           </a:xfrm>
           <a:prstGeom prst="rect">
             <a:avLst/>
@@ -15705,25 +16211,128 @@
           <a:lstStyle/>
           <a:p>
             <a:pPr marL="342900" indent="-342900">
-              <a:lnSpc>
-                <a:spcPct val="150000"/>
-              </a:lnSpc>
               <a:buFont typeface="Arial" panose="020B0604020202020204" pitchFamily="34" charset="0"/>
               <a:buChar char="•"/>
             </a:pPr>
             <a:r>
-              <a:rPr lang="de-DE" sz="2000" dirty="0" err="1"/>
-              <a:t>Jsp</a:t>
+              <a:rPr lang="de-DE" sz="2000" dirty="0" smtClean="0"/>
+              <a:t>Die Entwicklungsumgebung </a:t>
+            </a:r>
+            <a:r>
+              <a:rPr lang="de-DE" sz="2000" dirty="0" err="1" smtClean="0"/>
+              <a:t>Eclipse</a:t>
+            </a:r>
+            <a:r>
+              <a:rPr lang="de-DE" sz="2000" dirty="0" smtClean="0"/>
+              <a:t> </a:t>
+            </a:r>
+            <a:r>
+              <a:rPr lang="de-DE" sz="2000" dirty="0" smtClean="0"/>
+              <a:t>wird für die </a:t>
             </a:r>
             <a:r>
               <a:rPr lang="de-DE" sz="2000" dirty="0"/>
-              <a:t>, </a:t>
+              <a:t>Bearbeitung der JSPs, Servlets und Klassen </a:t>
+            </a:r>
+            <a:r>
+              <a:rPr lang="de-DE" sz="2000" dirty="0" smtClean="0"/>
+              <a:t>verwendet.</a:t>
+            </a:r>
+            <a:endParaRPr lang="de-DE" sz="2000" dirty="0"/>
+          </a:p>
+          <a:p>
+            <a:pPr marL="342900" indent="-342900">
+              <a:buFont typeface="Arial" panose="020B0604020202020204" pitchFamily="34" charset="0"/>
+              <a:buChar char="•"/>
+            </a:pPr>
+            <a:r>
+              <a:rPr lang="de-DE" sz="2000" dirty="0" smtClean="0"/>
+              <a:t>Getestet wird die Anwendung auf dem </a:t>
+            </a:r>
+            <a:r>
+              <a:rPr lang="de-DE" sz="2000" dirty="0" err="1" smtClean="0"/>
+              <a:t>Tomcat</a:t>
+            </a:r>
+            <a:r>
+              <a:rPr lang="de-DE" sz="2000" dirty="0" smtClean="0"/>
+              <a:t>-Webserver </a:t>
+            </a:r>
+            <a:r>
+              <a:rPr lang="de-DE" sz="2000" dirty="0"/>
+              <a:t>und die MySQL Datenbank von </a:t>
+            </a:r>
+            <a:r>
+              <a:rPr lang="de-DE" sz="2000" dirty="0" err="1" smtClean="0"/>
+              <a:t>Xampp</a:t>
+            </a:r>
+            <a:r>
+              <a:rPr lang="de-DE" sz="2000" dirty="0" smtClean="0"/>
+              <a:t>.</a:t>
+            </a:r>
+            <a:endParaRPr lang="de-DE" sz="2000" dirty="0" smtClean="0"/>
+          </a:p>
+          <a:p>
+            <a:pPr marL="342900" indent="-342900">
+              <a:buFont typeface="Arial" panose="020B0604020202020204" pitchFamily="34" charset="0"/>
+              <a:buChar char="•"/>
+            </a:pPr>
+            <a:r>
+              <a:rPr lang="de-DE" sz="2000" dirty="0" smtClean="0"/>
+              <a:t>Zur </a:t>
+            </a:r>
+            <a:r>
+              <a:rPr lang="de-DE" sz="2000" dirty="0"/>
+              <a:t>Versionsverwaltung </a:t>
+            </a:r>
+            <a:r>
+              <a:rPr lang="de-DE" sz="2000" dirty="0" smtClean="0"/>
+              <a:t>des Quellcodes und der Dokumente werden </a:t>
             </a:r>
             <a:r>
               <a:rPr lang="de-DE" sz="2000" dirty="0" err="1"/>
-              <a:t>blabla</a:t>
+              <a:t>Git</a:t>
             </a:r>
-            <a:endParaRPr lang="de-DE" sz="2000" dirty="0"/>
+            <a:r>
+              <a:rPr lang="de-DE" sz="2000" dirty="0"/>
+              <a:t> und das Online-Repository Gitlab.com verwendet.</a:t>
+            </a:r>
+          </a:p>
+          <a:p>
+            <a:pPr marL="342900" indent="-342900">
+              <a:buFont typeface="Arial" panose="020B0604020202020204" pitchFamily="34" charset="0"/>
+              <a:buChar char="•"/>
+            </a:pPr>
+            <a:r>
+              <a:rPr lang="de-DE" sz="2000" dirty="0" smtClean="0"/>
+              <a:t>Dokumente</a:t>
+            </a:r>
+            <a:r>
+              <a:rPr lang="de-DE" sz="2000" dirty="0"/>
+              <a:t>, Modelle und Grafiken werden mit Hilfe von Word, Visio, Excel und </a:t>
+            </a:r>
+            <a:r>
+              <a:rPr lang="de-DE" sz="2000" dirty="0" err="1"/>
+              <a:t>StarUML</a:t>
+            </a:r>
+            <a:r>
+              <a:rPr lang="de-DE" sz="2000" dirty="0"/>
+              <a:t> erstellt. </a:t>
+            </a:r>
+            <a:endParaRPr lang="de-DE" sz="2000" dirty="0" smtClean="0"/>
+          </a:p>
+          <a:p>
+            <a:pPr marL="342900" indent="-342900">
+              <a:buFont typeface="Arial" panose="020B0604020202020204" pitchFamily="34" charset="0"/>
+              <a:buChar char="•"/>
+            </a:pPr>
+            <a:r>
+              <a:rPr lang="de-DE" sz="2000" dirty="0" smtClean="0"/>
+              <a:t>Für </a:t>
+            </a:r>
+            <a:r>
+              <a:rPr lang="de-DE" sz="2000" dirty="0"/>
+              <a:t>die Projektplanung wird MS Project genutzt.</a:t>
+            </a:r>
           </a:p>
           <a:p>
             <a:pPr>
@@ -15731,6 +16340,10 @@
                 <a:spcPct val="150000"/>
               </a:lnSpc>
             </a:pPr>
+            <a:r>
+              <a:rPr lang="de-DE" sz="2000" dirty="0"/>
+              <a:t/>
+            </a:r>
             <a:br>
               <a:rPr lang="de-DE" sz="2000" dirty="0"/>
             </a:br>
@@ -15856,7 +16469,7 @@
                 <a:gridCol w="10139145">
                   <a:extLst>
                     <a:ext uri="{9D8B030D-6E8A-4147-A177-3AD203B41FA5}">
-                      <a16:colId xmlns:a16="http://schemas.microsoft.com/office/drawing/2014/main" val="2115616395"/>
+                      <a16:colId xmlns="" xmlns:a16="http://schemas.microsoft.com/office/drawing/2014/main" val="2115616395"/>
                     </a:ext>
                   </a:extLst>
                 </a:gridCol>
@@ -15877,7 +16490,7 @@
                 </a:tc>
                 <a:extLst>
                   <a:ext uri="{0D108BD9-81ED-4DB2-BD59-A6C34878D82A}">
-                    <a16:rowId xmlns:a16="http://schemas.microsoft.com/office/drawing/2014/main" val="2878913557"/>
+                    <a16:rowId xmlns="" xmlns:a16="http://schemas.microsoft.com/office/drawing/2014/main" val="2878913557"/>
                   </a:ext>
                 </a:extLst>
               </a:tr>
@@ -15974,7 +16587,7 @@
                 </a:tc>
                 <a:extLst>
                   <a:ext uri="{0D108BD9-81ED-4DB2-BD59-A6C34878D82A}">
-                    <a16:rowId xmlns:a16="http://schemas.microsoft.com/office/drawing/2014/main" val="1318711764"/>
+                    <a16:rowId xmlns="" xmlns:a16="http://schemas.microsoft.com/office/drawing/2014/main" val="1318711764"/>
                   </a:ext>
                 </a:extLst>
               </a:tr>
@@ -16022,7 +16635,7 @@
                 </a:tc>
                 <a:extLst>
                   <a:ext uri="{0D108BD9-81ED-4DB2-BD59-A6C34878D82A}">
-                    <a16:rowId xmlns:a16="http://schemas.microsoft.com/office/drawing/2014/main" val="3980817541"/>
+                    <a16:rowId xmlns="" xmlns:a16="http://schemas.microsoft.com/office/drawing/2014/main" val="3980817541"/>
                   </a:ext>
                 </a:extLst>
               </a:tr>
@@ -16070,7 +16683,7 @@
                 </a:tc>
                 <a:extLst>
                   <a:ext uri="{0D108BD9-81ED-4DB2-BD59-A6C34878D82A}">
-                    <a16:rowId xmlns:a16="http://schemas.microsoft.com/office/drawing/2014/main" val="4085928722"/>
+                    <a16:rowId xmlns="" xmlns:a16="http://schemas.microsoft.com/office/drawing/2014/main" val="4085928722"/>
                   </a:ext>
                 </a:extLst>
               </a:tr>
@@ -16110,7 +16723,7 @@
                 </a:tc>
                 <a:extLst>
                   <a:ext uri="{0D108BD9-81ED-4DB2-BD59-A6C34878D82A}">
-                    <a16:rowId xmlns:a16="http://schemas.microsoft.com/office/drawing/2014/main" val="4085036091"/>
+                    <a16:rowId xmlns="" xmlns:a16="http://schemas.microsoft.com/office/drawing/2014/main" val="4085036091"/>
                   </a:ext>
                 </a:extLst>
               </a:tr>
@@ -16164,7 +16777,7 @@
                 </a:tc>
                 <a:extLst>
                   <a:ext uri="{0D108BD9-81ED-4DB2-BD59-A6C34878D82A}">
-                    <a16:rowId xmlns:a16="http://schemas.microsoft.com/office/drawing/2014/main" val="1646418818"/>
+                    <a16:rowId xmlns="" xmlns:a16="http://schemas.microsoft.com/office/drawing/2014/main" val="1646418818"/>
                   </a:ext>
                 </a:extLst>
               </a:tr>
@@ -16212,7 +16825,7 @@
                 </a:tc>
                 <a:extLst>
                   <a:ext uri="{0D108BD9-81ED-4DB2-BD59-A6C34878D82A}">
-                    <a16:rowId xmlns:a16="http://schemas.microsoft.com/office/drawing/2014/main" val="960816759"/>
+                    <a16:rowId xmlns="" xmlns:a16="http://schemas.microsoft.com/office/drawing/2014/main" val="960816759"/>
                   </a:ext>
                 </a:extLst>
               </a:tr>
@@ -16266,7 +16879,7 @@
                 </a:tc>
                 <a:extLst>
                   <a:ext uri="{0D108BD9-81ED-4DB2-BD59-A6C34878D82A}">
-                    <a16:rowId xmlns:a16="http://schemas.microsoft.com/office/drawing/2014/main" val="2854300027"/>
+                    <a16:rowId xmlns="" xmlns:a16="http://schemas.microsoft.com/office/drawing/2014/main" val="2854300027"/>
                   </a:ext>
                 </a:extLst>
               </a:tr>
@@ -16361,7 +16974,7 @@
                 <a:gridCol w="10139145">
                   <a:extLst>
                     <a:ext uri="{9D8B030D-6E8A-4147-A177-3AD203B41FA5}">
-                      <a16:colId xmlns:a16="http://schemas.microsoft.com/office/drawing/2014/main" val="2115616395"/>
+                      <a16:colId xmlns="" xmlns:a16="http://schemas.microsoft.com/office/drawing/2014/main" val="2115616395"/>
                     </a:ext>
                   </a:extLst>
                 </a:gridCol>
@@ -16382,7 +16995,7 @@
                 </a:tc>
                 <a:extLst>
                   <a:ext uri="{0D108BD9-81ED-4DB2-BD59-A6C34878D82A}">
-                    <a16:rowId xmlns:a16="http://schemas.microsoft.com/office/drawing/2014/main" val="2878913557"/>
+                    <a16:rowId xmlns="" xmlns:a16="http://schemas.microsoft.com/office/drawing/2014/main" val="2878913557"/>
                   </a:ext>
                 </a:extLst>
               </a:tr>
@@ -16409,7 +17022,7 @@
                 </a:tc>
                 <a:extLst>
                   <a:ext uri="{0D108BD9-81ED-4DB2-BD59-A6C34878D82A}">
-                    <a16:rowId xmlns:a16="http://schemas.microsoft.com/office/drawing/2014/main" val="1318711764"/>
+                    <a16:rowId xmlns="" xmlns:a16="http://schemas.microsoft.com/office/drawing/2014/main" val="1318711764"/>
                   </a:ext>
                 </a:extLst>
               </a:tr>
@@ -16442,7 +17055,7 @@
                 </a:tc>
                 <a:extLst>
                   <a:ext uri="{0D108BD9-81ED-4DB2-BD59-A6C34878D82A}">
-                    <a16:rowId xmlns:a16="http://schemas.microsoft.com/office/drawing/2014/main" val="3980817541"/>
+                    <a16:rowId xmlns="" xmlns:a16="http://schemas.microsoft.com/office/drawing/2014/main" val="3980817541"/>
                   </a:ext>
                 </a:extLst>
               </a:tr>
@@ -16469,7 +17082,7 @@
                 </a:tc>
                 <a:extLst>
                   <a:ext uri="{0D108BD9-81ED-4DB2-BD59-A6C34878D82A}">
-                    <a16:rowId xmlns:a16="http://schemas.microsoft.com/office/drawing/2014/main" val="4085928722"/>
+                    <a16:rowId xmlns="" xmlns:a16="http://schemas.microsoft.com/office/drawing/2014/main" val="4085928722"/>
                   </a:ext>
                 </a:extLst>
               </a:tr>
@@ -16517,7 +17130,7 @@
                 </a:tc>
                 <a:extLst>
                   <a:ext uri="{0D108BD9-81ED-4DB2-BD59-A6C34878D82A}">
-                    <a16:rowId xmlns:a16="http://schemas.microsoft.com/office/drawing/2014/main" val="4085036091"/>
+                    <a16:rowId xmlns="" xmlns:a16="http://schemas.microsoft.com/office/drawing/2014/main" val="4085036091"/>
                   </a:ext>
                 </a:extLst>
               </a:tr>
@@ -16565,7 +17178,7 @@
                 </a:tc>
                 <a:extLst>
                   <a:ext uri="{0D108BD9-81ED-4DB2-BD59-A6C34878D82A}">
-                    <a16:rowId xmlns:a16="http://schemas.microsoft.com/office/drawing/2014/main" val="114910492"/>
+                    <a16:rowId xmlns="" xmlns:a16="http://schemas.microsoft.com/office/drawing/2014/main" val="114910492"/>
                   </a:ext>
                 </a:extLst>
               </a:tr>
@@ -16619,7 +17232,7 @@
                 </a:tc>
                 <a:extLst>
                   <a:ext uri="{0D108BD9-81ED-4DB2-BD59-A6C34878D82A}">
-                    <a16:rowId xmlns:a16="http://schemas.microsoft.com/office/drawing/2014/main" val="1605604220"/>
+                    <a16:rowId xmlns="" xmlns:a16="http://schemas.microsoft.com/office/drawing/2014/main" val="1605604220"/>
                   </a:ext>
                 </a:extLst>
               </a:tr>
@@ -16667,7 +17280,7 @@
                 </a:tc>
                 <a:extLst>
                   <a:ext uri="{0D108BD9-81ED-4DB2-BD59-A6C34878D82A}">
-                    <a16:rowId xmlns:a16="http://schemas.microsoft.com/office/drawing/2014/main" val="300888892"/>
+                    <a16:rowId xmlns="" xmlns:a16="http://schemas.microsoft.com/office/drawing/2014/main" val="300888892"/>
                   </a:ext>
                 </a:extLst>
               </a:tr>
@@ -16715,7 +17328,7 @@
                 </a:tc>
                 <a:extLst>
                   <a:ext uri="{0D108BD9-81ED-4DB2-BD59-A6C34878D82A}">
-                    <a16:rowId xmlns:a16="http://schemas.microsoft.com/office/drawing/2014/main" val="740151589"/>
+                    <a16:rowId xmlns="" xmlns:a16="http://schemas.microsoft.com/office/drawing/2014/main" val="740151589"/>
                   </a:ext>
                 </a:extLst>
               </a:tr>
@@ -16810,7 +17423,7 @@
                 <a:gridCol w="10139145">
                   <a:extLst>
                     <a:ext uri="{9D8B030D-6E8A-4147-A177-3AD203B41FA5}">
-                      <a16:colId xmlns:a16="http://schemas.microsoft.com/office/drawing/2014/main" val="2115616395"/>
+                      <a16:colId xmlns="" xmlns:a16="http://schemas.microsoft.com/office/drawing/2014/main" val="2115616395"/>
                     </a:ext>
                   </a:extLst>
                 </a:gridCol>
@@ -16831,7 +17444,7 @@
                 </a:tc>
                 <a:extLst>
                   <a:ext uri="{0D108BD9-81ED-4DB2-BD59-A6C34878D82A}">
-                    <a16:rowId xmlns:a16="http://schemas.microsoft.com/office/drawing/2014/main" val="2878913557"/>
+                    <a16:rowId xmlns="" xmlns:a16="http://schemas.microsoft.com/office/drawing/2014/main" val="2878913557"/>
                   </a:ext>
                 </a:extLst>
               </a:tr>
@@ -16858,7 +17471,7 @@
                 </a:tc>
                 <a:extLst>
                   <a:ext uri="{0D108BD9-81ED-4DB2-BD59-A6C34878D82A}">
-                    <a16:rowId xmlns:a16="http://schemas.microsoft.com/office/drawing/2014/main" val="1318711764"/>
+                    <a16:rowId xmlns="" xmlns:a16="http://schemas.microsoft.com/office/drawing/2014/main" val="1318711764"/>
                   </a:ext>
                 </a:extLst>
               </a:tr>
@@ -16906,7 +17519,7 @@
                 </a:tc>
                 <a:extLst>
                   <a:ext uri="{0D108BD9-81ED-4DB2-BD59-A6C34878D82A}">
-                    <a16:rowId xmlns:a16="http://schemas.microsoft.com/office/drawing/2014/main" val="3980817541"/>
+                    <a16:rowId xmlns="" xmlns:a16="http://schemas.microsoft.com/office/drawing/2014/main" val="3980817541"/>
                   </a:ext>
                 </a:extLst>
               </a:tr>
@@ -16966,7 +17579,7 @@
                 </a:tc>
                 <a:extLst>
                   <a:ext uri="{0D108BD9-81ED-4DB2-BD59-A6C34878D82A}">
-                    <a16:rowId xmlns:a16="http://schemas.microsoft.com/office/drawing/2014/main" val="4085928722"/>
+                    <a16:rowId xmlns="" xmlns:a16="http://schemas.microsoft.com/office/drawing/2014/main" val="4085928722"/>
                   </a:ext>
                 </a:extLst>
               </a:tr>
@@ -17181,6 +17794,13 @@
   <p:clrMapOvr>
     <a:masterClrMapping/>
   </p:clrMapOvr>
+  <p:timing>
+    <p:tnLst>
+      <p:par>
+        <p:cTn id="1" dur="indefinite" restart="never" nodeType="tmRoot"/>
+      </p:par>
+    </p:tnLst>
+  </p:timing>
 </p:sld>
 </file>
 

</xml_diff>